<commit_message>
Update Abgabe Audit 4
</commit_message>
<xml_diff>
--- a/EP_Abgabe_Audit_4_Präsentation_Ebel_Juwig/EP_Abgabe_Audit_4_Präsentation_Ebel_Juwig.pptx
+++ b/EP_Abgabe_Audit_4_Präsentation_Ebel_Juwig/EP_Abgabe_Audit_4_Präsentation_Ebel_Juwig.pptx
@@ -10936,100 +10936,52 @@
       </p:sp>
       <p:sp>
         <p:nvSpPr>
-          <p:cNvPr id="5" name="" hidden="0"/>
-          <p:cNvSpPr/>
+          <p:cNvPr id="5" name="Slide Number Placeholder 5" hidden="0"/>
+          <p:cNvSpPr>
+            <a:spLocks noGrp="1"/>
+          </p:cNvSpPr>
+          <p:nvPr isPhoto="0" userDrawn="0">
+            <p:ph type="sldNum" sz="quarter" idx="12" hasCustomPrompt="0"/>
+          </p:nvPr>
+        </p:nvSpPr>
+        <p:spPr bwMode="auto"/>
+        <p:txBody>
+          <a:bodyPr/>
+          <a:lstStyle/>
+          <a:p>
+            <a:pPr>
+              <a:defRPr/>
+            </a:pPr>
+            <a:fld id="{05A746AC-7DEA-23DA-4B01-6648AE07C1FD}" type="slidenum">
+              <a:rPr lang="en-US"/>
+              <a:t>8</a:t>
+            </a:fld>
+            <a:endParaRPr lang="en-US"/>
+          </a:p>
+        </p:txBody>
+      </p:sp>
+      <p:pic>
+        <p:nvPicPr>
+          <p:cNvPr id="6" name="" hidden="0"/>
+          <p:cNvPicPr>
+            <a:picLocks noChangeAspect="1"/>
+          </p:cNvPicPr>
           <p:nvPr isPhoto="0" userDrawn="0"/>
-        </p:nvSpPr>
+        </p:nvPicPr>
+        <p:blipFill>
+          <a:blip r:embed="rId2"/>
+          <a:stretch/>
+        </p:blipFill>
         <p:spPr bwMode="auto">
-          <a:xfrm flipH="0" flipV="0">
-            <a:off x="400337" y="2090801"/>
-            <a:ext cx="4646655" cy="2016338"/>
+          <a:xfrm>
+            <a:off x="1293693" y="1690687"/>
+            <a:ext cx="9344024" cy="3790949"/>
           </a:xfrm>
           <a:prstGeom prst="rect">
             <a:avLst/>
           </a:prstGeom>
-          <a:noFill/>
         </p:spPr>
-        <p:txBody>
-          <a:bodyPr vertOverflow="overflow" horzOverflow="clip" vert="horz" wrap="square" lIns="91440" tIns="45720" rIns="91440" bIns="45720" numCol="1" spcCol="0" rtlCol="0" fromWordArt="0" anchor="t" anchorCtr="0" forceAA="0" upright="0" compatLnSpc="0">
-            <a:noAutofit/>
-          </a:bodyPr>
-          <a:p>
-            <a:pPr marL="283879" indent="-283879">
-              <a:buFont typeface="Arial"/>
-              <a:buChar char="•"/>
-              <a:defRPr/>
-            </a:pPr>
-            <a:r>
-              <a:rPr/>
-              <a:t>id: Ist ein aufsteigender Zahlenwert</a:t>
-            </a:r>
-            <a:endParaRPr/>
-          </a:p>
-          <a:p>
-            <a:pPr>
-              <a:defRPr/>
-            </a:pPr>
-            <a:endParaRPr/>
-          </a:p>
-          <a:p>
-            <a:pPr marL="283879" indent="-283879">
-              <a:buFont typeface="Arial"/>
-              <a:buChar char="•"/>
-              <a:defRPr/>
-            </a:pPr>
-            <a:r>
-              <a:rPr/>
-              <a:t>Bezeichung: Beschreibt den Namen</a:t>
-            </a:r>
-            <a:endParaRPr/>
-          </a:p>
-          <a:p>
-            <a:pPr>
-              <a:defRPr/>
-            </a:pPr>
-            <a:endParaRPr/>
-          </a:p>
-          <a:p>
-            <a:pPr marL="283879" indent="-283879">
-              <a:buFont typeface="Arial"/>
-              <a:buChar char="•"/>
-              <a:defRPr/>
-            </a:pPr>
-            <a:r>
-              <a:rPr/>
-              <a:t>Typ: Bestimmt den Bereich in dem der Tag in unserer Anwendung angewendet werden kann</a:t>
-            </a:r>
-            <a:endParaRPr/>
-          </a:p>
-        </p:txBody>
-      </p:sp>
-      <p:sp>
-        <p:nvSpPr>
-          <p:cNvPr id="6" name="Slide Number Placeholder 5" hidden="0"/>
-          <p:cNvSpPr>
-            <a:spLocks noGrp="1"/>
-          </p:cNvSpPr>
-          <p:nvPr isPhoto="0" userDrawn="0">
-            <p:ph type="sldNum" sz="quarter" idx="12" hasCustomPrompt="0"/>
-          </p:nvPr>
-        </p:nvSpPr>
-        <p:spPr bwMode="auto"/>
-        <p:txBody>
-          <a:bodyPr/>
-          <a:lstStyle/>
-          <a:p>
-            <a:pPr>
-              <a:defRPr/>
-            </a:pPr>
-            <a:fld id="{05A746AC-7DEA-23DA-4B01-6648AE07C1FD}" type="slidenum">
-              <a:rPr lang="en-US"/>
-              <a:t>8</a:t>
-            </a:fld>
-            <a:endParaRPr lang="en-US"/>
-          </a:p>
-        </p:txBody>
-      </p:sp>
+      </p:pic>
     </p:spTree>
   </p:cSld>
   <p:clrMapOvr>

</xml_diff>